<commit_message>
Lagt til presentasjon og løsningsforslag til oppgavene
</commit_message>
<xml_diff>
--- a/IT-Workshop-V25.pptx
+++ b/IT-Workshop-V25.pptx
@@ -7754,10 +7754,10 @@
       </p:sp>
       <p:pic>
         <p:nvPicPr>
-          <p:cNvPr id="4" name="Bilde 3">
-            <a:extLst>
-              <a:ext uri="{FF2B5EF4-FFF2-40B4-BE49-F238E27FC236}">
-                <a16:creationId xmlns:a16="http://schemas.microsoft.com/office/drawing/2014/main" id="{311E8069-27E2-36BA-172A-E85083C3C693}"/>
+          <p:cNvPr id="3" name="Bilde 2">
+            <a:extLst>
+              <a:ext uri="{FF2B5EF4-FFF2-40B4-BE49-F238E27FC236}">
+                <a16:creationId xmlns:a16="http://schemas.microsoft.com/office/drawing/2014/main" id="{EB085C12-1A53-D669-5E88-BEE800D5957F}"/>
               </a:ext>
             </a:extLst>
           </p:cNvPr>
@@ -7774,8 +7774,8 @@
         </p:blipFill>
         <p:spPr>
           <a:xfrm>
-            <a:off x="3076996" y="1644062"/>
-            <a:ext cx="6497354" cy="5167307"/>
+            <a:off x="3213098" y="1617525"/>
+            <a:ext cx="5765800" cy="5207000"/>
           </a:xfrm>
           <a:prstGeom prst="rect">
             <a:avLst/>

</xml_diff>